<commit_message>
Small edits in README and presentation
</commit_message>
<xml_diff>
--- a/modelos_riesgo_y_propension.pptx
+++ b/modelos_riesgo_y_propension.pptx
@@ -10310,7 +10310,7 @@
           <a:p>
             <a:fld id="{660C2ACA-4ACB-A349-AFCA-AF5D4F8C6519}" type="datetimeFigureOut">
               <a:rPr lang="en-US" smtClean="0"/>
-              <a:t>5/2/25</a:t>
+              <a:t>5/7/25</a:t>
             </a:fld>
             <a:endParaRPr lang="en-US"/>
           </a:p>
@@ -10480,7 +10480,7 @@
           <a:p>
             <a:fld id="{660C2ACA-4ACB-A349-AFCA-AF5D4F8C6519}" type="datetimeFigureOut">
               <a:rPr lang="en-US" smtClean="0"/>
-              <a:t>5/2/25</a:t>
+              <a:t>5/7/25</a:t>
             </a:fld>
             <a:endParaRPr lang="en-US"/>
           </a:p>
@@ -10660,7 +10660,7 @@
           <a:p>
             <a:fld id="{660C2ACA-4ACB-A349-AFCA-AF5D4F8C6519}" type="datetimeFigureOut">
               <a:rPr lang="en-US" smtClean="0"/>
-              <a:t>5/2/25</a:t>
+              <a:t>5/7/25</a:t>
             </a:fld>
             <a:endParaRPr lang="en-US"/>
           </a:p>
@@ -10830,7 +10830,7 @@
           <a:p>
             <a:fld id="{660C2ACA-4ACB-A349-AFCA-AF5D4F8C6519}" type="datetimeFigureOut">
               <a:rPr lang="en-US" smtClean="0"/>
-              <a:t>5/2/25</a:t>
+              <a:t>5/7/25</a:t>
             </a:fld>
             <a:endParaRPr lang="en-US"/>
           </a:p>
@@ -11076,7 +11076,7 @@
           <a:p>
             <a:fld id="{660C2ACA-4ACB-A349-AFCA-AF5D4F8C6519}" type="datetimeFigureOut">
               <a:rPr lang="en-US" smtClean="0"/>
-              <a:t>5/2/25</a:t>
+              <a:t>5/7/25</a:t>
             </a:fld>
             <a:endParaRPr lang="en-US"/>
           </a:p>
@@ -11308,7 +11308,7 @@
           <a:p>
             <a:fld id="{660C2ACA-4ACB-A349-AFCA-AF5D4F8C6519}" type="datetimeFigureOut">
               <a:rPr lang="en-US" smtClean="0"/>
-              <a:t>5/2/25</a:t>
+              <a:t>5/7/25</a:t>
             </a:fld>
             <a:endParaRPr lang="en-US"/>
           </a:p>
@@ -11675,7 +11675,7 @@
           <a:p>
             <a:fld id="{660C2ACA-4ACB-A349-AFCA-AF5D4F8C6519}" type="datetimeFigureOut">
               <a:rPr lang="en-US" smtClean="0"/>
-              <a:t>5/2/25</a:t>
+              <a:t>5/7/25</a:t>
             </a:fld>
             <a:endParaRPr lang="en-US"/>
           </a:p>
@@ -11793,7 +11793,7 @@
           <a:p>
             <a:fld id="{660C2ACA-4ACB-A349-AFCA-AF5D4F8C6519}" type="datetimeFigureOut">
               <a:rPr lang="en-US" smtClean="0"/>
-              <a:t>5/2/25</a:t>
+              <a:t>5/7/25</a:t>
             </a:fld>
             <a:endParaRPr lang="en-US"/>
           </a:p>
@@ -11888,7 +11888,7 @@
           <a:p>
             <a:fld id="{660C2ACA-4ACB-A349-AFCA-AF5D4F8C6519}" type="datetimeFigureOut">
               <a:rPr lang="en-US" smtClean="0"/>
-              <a:t>5/2/25</a:t>
+              <a:t>5/7/25</a:t>
             </a:fld>
             <a:endParaRPr lang="en-US"/>
           </a:p>
@@ -12165,7 +12165,7 @@
           <a:p>
             <a:fld id="{660C2ACA-4ACB-A349-AFCA-AF5D4F8C6519}" type="datetimeFigureOut">
               <a:rPr lang="en-US" smtClean="0"/>
-              <a:t>5/2/25</a:t>
+              <a:t>5/7/25</a:t>
             </a:fld>
             <a:endParaRPr lang="en-US"/>
           </a:p>
@@ -12422,7 +12422,7 @@
           <a:p>
             <a:fld id="{660C2ACA-4ACB-A349-AFCA-AF5D4F8C6519}" type="datetimeFigureOut">
               <a:rPr lang="en-US" smtClean="0"/>
-              <a:t>5/2/25</a:t>
+              <a:t>5/7/25</a:t>
             </a:fld>
             <a:endParaRPr lang="en-US"/>
           </a:p>
@@ -12635,7 +12635,7 @@
           <a:p>
             <a:fld id="{660C2ACA-4ACB-A349-AFCA-AF5D4F8C6519}" type="datetimeFigureOut">
               <a:rPr lang="en-US" smtClean="0"/>
-              <a:t>5/2/25</a:t>
+              <a:t>5/7/25</a:t>
             </a:fld>
             <a:endParaRPr lang="en-US"/>
           </a:p>
@@ -16671,8 +16671,15 @@
             <a:pPr lvl="1"/>
             <a:r>
               <a:rPr lang="es-ES_tradnl" sz="1700" noProof="0" dirty="0"/>
-              <a:t>Tenemos nueva variable objetivo: product_2</a:t>
-            </a:r>
+              <a:t>Tenemos nueva variable objetivo: product_2 (</a:t>
+            </a:r>
+            <a:r>
+              <a:rPr lang="es-ES_tradnl" sz="1700" b="0" i="0" u="none" strike="noStrike" noProof="1">
+                <a:effectLst/>
+              </a:rPr>
+              <a:t>NAME_PRODUCT_TYPE)</a:t>
+            </a:r>
+            <a:endParaRPr lang="es-ES_tradnl" sz="1700" noProof="0" dirty="0"/>
           </a:p>
           <a:p>
             <a:pPr lvl="1"/>
@@ -18733,7 +18740,7 @@
               <a:rPr lang="es-ES_tradnl" b="1" i="0" u="none" strike="noStrike" noProof="0" dirty="0">
                 <a:effectLst/>
               </a:rPr>
-              <a:t>Test </a:t>
+              <a:t>Train </a:t>
             </a:r>
             <a:r>
               <a:rPr lang="es-ES_tradnl" b="1" i="0" u="none" strike="noStrike" noProof="0" dirty="0" err="1">
@@ -18745,7 +18752,33 @@
               <a:rPr lang="es-ES_tradnl" b="0" i="0" u="none" strike="noStrike" noProof="0" dirty="0">
                 <a:effectLst/>
               </a:rPr>
-              <a:t> (0.8462 vs. 0.7981) y, por tanto, se elige para maximizar la detección de clientes con alta propensión a contratar Producto 2.</a:t>
+              <a:t> (</a:t>
+            </a:r>
+            <a:r>
+              <a:rPr lang="es-ES_tradnl" sz="1800" noProof="0" dirty="0"/>
+              <a:t>0.808 </a:t>
+            </a:r>
+            <a:r>
+              <a:rPr lang="es-ES_tradnl" b="0" i="0" u="none" strike="noStrike" noProof="0" dirty="0">
+                <a:effectLst/>
+              </a:rPr>
+              <a:t>vs. </a:t>
+            </a:r>
+            <a:r>
+              <a:rPr lang="es-ES_tradnl" sz="1800" noProof="0"/>
+              <a:t>0.740</a:t>
+            </a:r>
+            <a:r>
+              <a:rPr lang="es-ES_tradnl" b="0" i="0" u="none" strike="noStrike" noProof="0">
+                <a:effectLst/>
+              </a:rPr>
+              <a:t>) </a:t>
+            </a:r>
+            <a:r>
+              <a:rPr lang="es-ES_tradnl" b="0" i="0" u="none" strike="noStrike" noProof="0" dirty="0">
+                <a:effectLst/>
+              </a:rPr>
+              <a:t>y, por tanto, se elige para maximizar la detección de clientes con alta propensión a contratar Producto 2.</a:t>
             </a:r>
             <a:endParaRPr lang="es-ES_tradnl" noProof="0" dirty="0"/>
           </a:p>
@@ -21781,7 +21814,7 @@
         </p:nvSpPr>
         <p:spPr>
           <a:xfrm>
-            <a:off x="1043631" y="809898"/>
+            <a:off x="1043631" y="795610"/>
             <a:ext cx="9942716" cy="1554480"/>
           </a:xfrm>
           <a:prstGeom prst="rect">
@@ -21842,8 +21875,8 @@
         </p:nvSpPr>
         <p:spPr>
           <a:xfrm>
-            <a:off x="1045028" y="3017522"/>
-            <a:ext cx="9941319" cy="3124658"/>
+            <a:off x="1045028" y="2200280"/>
+            <a:ext cx="9941319" cy="4113355"/>
           </a:xfrm>
           <a:prstGeom prst="rect">
             <a:avLst/>
@@ -21851,175 +21884,259 @@
         </p:spPr>
         <p:txBody>
           <a:bodyPr vert="horz" lIns="91440" tIns="45720" rIns="91440" bIns="45720" rtlCol="0" anchor="ctr">
-            <a:normAutofit/>
+            <a:normAutofit fontScale="92500" lnSpcReduction="20000"/>
           </a:bodyPr>
           <a:lstStyle/>
           <a:p>
-            <a:pPr indent="-228600" defTabSz="914400">
-              <a:lnSpc>
-                <a:spcPct val="90000"/>
-              </a:lnSpc>
-              <a:buFont typeface="Arial" panose="020B0604020202020204" pitchFamily="34" charset="0"/>
-              <a:buChar char="•"/>
-            </a:pPr>
-            <a:r>
-              <a:rPr lang="es-ES_tradnl" sz="1500" b="1" i="0" u="none" strike="noStrike" noProof="0" dirty="0">
-                <a:effectLst/>
-              </a:rPr>
-              <a:t>Problema de negocio y reto:  </a:t>
-            </a:r>
-          </a:p>
-          <a:p>
-            <a:pPr indent="-228600" defTabSz="914400">
-              <a:lnSpc>
-                <a:spcPct val="90000"/>
-              </a:lnSpc>
-              <a:buFont typeface="Arial" panose="020B0604020202020204" pitchFamily="34" charset="0"/>
-              <a:buChar char="•"/>
-            </a:pPr>
-            <a:endParaRPr lang="es-ES_tradnl" sz="1500" b="1" i="0" u="none" strike="noStrike" noProof="0" dirty="0">
-              <a:effectLst/>
-            </a:endParaRPr>
-          </a:p>
-          <a:p>
-            <a:pPr lvl="1" indent="-228600" defTabSz="914400">
-              <a:lnSpc>
-                <a:spcPct val="90000"/>
-              </a:lnSpc>
-              <a:buFont typeface="Arial" panose="020B0604020202020204" pitchFamily="34" charset="0"/>
-              <a:buChar char="•"/>
-            </a:pPr>
-            <a:r>
-              <a:rPr lang="es-ES_tradnl" sz="1500" b="1" i="0" u="none" strike="noStrike" noProof="0" dirty="0">
-                <a:effectLst/>
-              </a:rPr>
-              <a:t>- Cada oferta de producto implica un coste, especialmente si el cliente no cumple con los términos contractuales.  </a:t>
-            </a:r>
-          </a:p>
-          <a:p>
-            <a:pPr lvl="1" indent="-228600" defTabSz="914400">
-              <a:lnSpc>
-                <a:spcPct val="90000"/>
-              </a:lnSpc>
-              <a:buFont typeface="Arial" panose="020B0604020202020204" pitchFamily="34" charset="0"/>
-              <a:buChar char="•"/>
-            </a:pPr>
-            <a:r>
-              <a:rPr lang="es-ES_tradnl" sz="1500" b="1" i="0" u="none" strike="noStrike" noProof="0" dirty="0">
-                <a:effectLst/>
-              </a:rPr>
-              <a:t>- Necesitamos maximizar las ventas de nuestro nuevo Producto 2 y para ello identificar qué clientes tienen mayor propensión a adquirir cada producto.</a:t>
-            </a:r>
-          </a:p>
-          <a:p>
-            <a:pPr indent="-228600" defTabSz="914400">
-              <a:lnSpc>
-                <a:spcPct val="90000"/>
-              </a:lnSpc>
-              <a:buFont typeface="Arial" panose="020B0604020202020204" pitchFamily="34" charset="0"/>
-              <a:buChar char="•"/>
-            </a:pPr>
-            <a:endParaRPr lang="es-ES_tradnl" sz="1500" b="1" i="0" u="none" strike="noStrike" noProof="0" dirty="0">
-              <a:effectLst/>
-            </a:endParaRPr>
-          </a:p>
-          <a:p>
-            <a:pPr indent="-228600" defTabSz="914400">
-              <a:lnSpc>
-                <a:spcPct val="90000"/>
-              </a:lnSpc>
-              <a:buFont typeface="Arial" panose="020B0604020202020204" pitchFamily="34" charset="0"/>
-              <a:buChar char="•"/>
-            </a:pPr>
-            <a:r>
-              <a:rPr lang="es-ES_tradnl" sz="1500" b="1" i="0" u="none" strike="noStrike" noProof="0" dirty="0">
-                <a:effectLst/>
-              </a:rPr>
-              <a:t>Preguntas Clave:</a:t>
-            </a:r>
-          </a:p>
-          <a:p>
-            <a:pPr indent="-228600" defTabSz="914400">
-              <a:lnSpc>
-                <a:spcPct val="90000"/>
-              </a:lnSpc>
-              <a:buFont typeface="Arial" panose="020B0604020202020204" pitchFamily="34" charset="0"/>
-              <a:buChar char="•"/>
-            </a:pPr>
-            <a:endParaRPr lang="es-ES_tradnl" sz="1500" b="1" i="0" u="none" strike="noStrike" noProof="0" dirty="0">
-              <a:effectLst/>
-            </a:endParaRPr>
-          </a:p>
-          <a:p>
-            <a:pPr lvl="1" indent="-228600" defTabSz="914400">
-              <a:lnSpc>
-                <a:spcPct val="90000"/>
-              </a:lnSpc>
-              <a:buFont typeface="Arial" panose="020B0604020202020204" pitchFamily="34" charset="0"/>
-              <a:buChar char="•"/>
-            </a:pPr>
-            <a:r>
-              <a:rPr lang="es-ES_tradnl" sz="1500" b="1" i="0" u="none" strike="noStrike" noProof="0" dirty="0">
-                <a:effectLst/>
-              </a:rPr>
-              <a:t>1. ¿Cómo identificamos clientes no cumplidores (preparación de datos, métricas, rendimiento)?  </a:t>
-            </a:r>
-          </a:p>
-          <a:p>
-            <a:pPr lvl="1" indent="-228600" defTabSz="914400">
-              <a:lnSpc>
-                <a:spcPct val="90000"/>
-              </a:lnSpc>
-              <a:buFont typeface="Arial" panose="020B0604020202020204" pitchFamily="34" charset="0"/>
-              <a:buChar char="•"/>
-            </a:pPr>
-            <a:r>
-              <a:rPr lang="es-ES_tradnl" sz="1500" b="1" i="0" u="none" strike="noStrike" noProof="0" dirty="0">
-                <a:effectLst/>
-              </a:rPr>
-              <a:t>2. ¿A quién ofrecer Producto 1 vs. Producto 2, y qué segmentos podemos definir?  </a:t>
-            </a:r>
-          </a:p>
-          <a:p>
-            <a:pPr lvl="1" indent="-228600" defTabSz="914400">
-              <a:lnSpc>
-                <a:spcPct val="90000"/>
-              </a:lnSpc>
-              <a:buFont typeface="Arial" panose="020B0604020202020204" pitchFamily="34" charset="0"/>
-              <a:buChar char="•"/>
-            </a:pPr>
-            <a:r>
-              <a:rPr lang="es-ES_tradnl" sz="1500" b="1" i="0" u="none" strike="noStrike" noProof="0" dirty="0">
-                <a:effectLst/>
-              </a:rPr>
-              <a:t>3. ¿Son justas nuestras decisiones según género, edad, educación, etc.?  </a:t>
-            </a:r>
-          </a:p>
-          <a:p>
-            <a:pPr lvl="1" indent="-228600" defTabSz="914400">
-              <a:lnSpc>
-                <a:spcPct val="90000"/>
-              </a:lnSpc>
-              <a:buFont typeface="Arial" panose="020B0604020202020204" pitchFamily="34" charset="0"/>
-              <a:buChar char="•"/>
-            </a:pPr>
-            <a:r>
-              <a:rPr lang="es-ES_tradnl" sz="1500" b="1" i="0" u="none" strike="noStrike" noProof="0" dirty="0">
-                <a:effectLst/>
-              </a:rPr>
-              <a:t>4. ¿Cómo detectamos y gestionamos la respuesta del modelo a las variaciones de factores económicos?</a:t>
-            </a:r>
-          </a:p>
-          <a:p>
-            <a:pPr indent="-228600" defTabSz="914400">
+            <a:pPr defTabSz="914400">
               <a:lnSpc>
                 <a:spcPct val="90000"/>
               </a:lnSpc>
               <a:spcAft>
                 <a:spcPts val="600"/>
               </a:spcAft>
-              <a:buFont typeface="Arial" panose="020B0604020202020204" pitchFamily="34" charset="0"/>
-              <a:buChar char="•"/>
+            </a:pPr>
+            <a:r>
+              <a:rPr lang="es-ES_tradnl" sz="1500" noProof="0" dirty="0"/>
+              <a:t>Se lanzó un piloto de un nuevo producto que superó expectativas. Ahora queremos:</a:t>
+            </a:r>
+          </a:p>
+          <a:p>
+            <a:pPr defTabSz="914400">
+              <a:lnSpc>
+                <a:spcPct val="90000"/>
+              </a:lnSpc>
+              <a:spcAft>
+                <a:spcPts val="600"/>
+              </a:spcAft>
+            </a:pPr>
+            <a:endParaRPr lang="es-ES_tradnl" sz="1500" noProof="0" dirty="0"/>
+          </a:p>
+          <a:p>
+            <a:pPr defTabSz="914400">
+              <a:lnSpc>
+                <a:spcPct val="90000"/>
+              </a:lnSpc>
+              <a:spcAft>
+                <a:spcPts val="600"/>
+              </a:spcAft>
+            </a:pPr>
+            <a:r>
+              <a:rPr lang="es-ES_tradnl" sz="1500" noProof="0" dirty="0"/>
+              <a:t>- </a:t>
+            </a:r>
+            <a:r>
+              <a:rPr lang="es-ES_tradnl" sz="1500" b="1" noProof="0" dirty="0"/>
+              <a:t>Reducir coste</a:t>
+            </a:r>
+            <a:r>
+              <a:rPr lang="es-ES_tradnl" sz="1500" noProof="0" dirty="0"/>
+              <a:t>: cada oferta a un cliente incumplidor genera pérdidas.  </a:t>
+            </a:r>
+          </a:p>
+          <a:p>
+            <a:pPr defTabSz="914400">
+              <a:lnSpc>
+                <a:spcPct val="90000"/>
+              </a:lnSpc>
+              <a:spcAft>
+                <a:spcPts val="600"/>
+              </a:spcAft>
+            </a:pPr>
+            <a:r>
+              <a:rPr lang="es-ES_tradnl" sz="1500" noProof="0" dirty="0"/>
+              <a:t>- </a:t>
+            </a:r>
+            <a:r>
+              <a:rPr lang="es-ES_tradnl" sz="1500" b="1" noProof="0" dirty="0"/>
+              <a:t>Maximizar ventas</a:t>
+            </a:r>
+            <a:r>
+              <a:rPr lang="es-ES_tradnl" sz="1500" noProof="0" dirty="0"/>
+              <a:t>: identificar quiénes tienen mayor propensión a cada producto (1 vs. 2).</a:t>
+            </a:r>
+          </a:p>
+          <a:p>
+            <a:pPr defTabSz="914400">
+              <a:lnSpc>
+                <a:spcPct val="90000"/>
+              </a:lnSpc>
+              <a:spcAft>
+                <a:spcPts val="600"/>
+              </a:spcAft>
+            </a:pPr>
+            <a:endParaRPr lang="es-ES_tradnl" sz="1500" noProof="0" dirty="0"/>
+          </a:p>
+          <a:p>
+            <a:pPr defTabSz="914400">
+              <a:lnSpc>
+                <a:spcPct val="90000"/>
+              </a:lnSpc>
+              <a:spcAft>
+                <a:spcPts val="600"/>
+              </a:spcAft>
+            </a:pPr>
+            <a:r>
+              <a:rPr lang="es-ES_tradnl" sz="1600" b="1" noProof="0" dirty="0"/>
+              <a:t>Preguntas clave:</a:t>
+            </a:r>
+          </a:p>
+          <a:p>
+            <a:pPr defTabSz="914400">
+              <a:lnSpc>
+                <a:spcPct val="90000"/>
+              </a:lnSpc>
+              <a:spcAft>
+                <a:spcPts val="600"/>
+              </a:spcAft>
+            </a:pPr>
+            <a:r>
+              <a:rPr lang="es-ES_tradnl" sz="1500" noProof="0" dirty="0"/>
+              <a:t>1. ¿Cómo detectamos clientes no cumplidores?</a:t>
+            </a:r>
+          </a:p>
+          <a:p>
+            <a:pPr defTabSz="914400">
+              <a:lnSpc>
+                <a:spcPct val="90000"/>
+              </a:lnSpc>
+              <a:spcAft>
+                <a:spcPts val="600"/>
+              </a:spcAft>
+            </a:pPr>
+            <a:r>
+              <a:rPr lang="es-ES_tradnl" sz="1500" noProof="0" dirty="0"/>
+              <a:t>   - Preparación de datos  </a:t>
+            </a:r>
+          </a:p>
+          <a:p>
+            <a:pPr defTabSz="914400">
+              <a:lnSpc>
+                <a:spcPct val="90000"/>
+              </a:lnSpc>
+              <a:spcAft>
+                <a:spcPts val="600"/>
+              </a:spcAft>
+            </a:pPr>
+            <a:r>
+              <a:rPr lang="es-ES_tradnl" sz="1500" noProof="0" dirty="0"/>
+              <a:t>   - Métrica óptima </a:t>
+            </a:r>
+          </a:p>
+          <a:p>
+            <a:pPr defTabSz="914400">
+              <a:lnSpc>
+                <a:spcPct val="90000"/>
+              </a:lnSpc>
+              <a:spcAft>
+                <a:spcPts val="600"/>
+              </a:spcAft>
+            </a:pPr>
+            <a:r>
+              <a:rPr lang="es-ES_tradnl" sz="1500" noProof="0" dirty="0"/>
+              <a:t>   - Validación del modelo</a:t>
+            </a:r>
+          </a:p>
+          <a:p>
+            <a:pPr defTabSz="914400">
+              <a:lnSpc>
+                <a:spcPct val="90000"/>
+              </a:lnSpc>
+              <a:spcAft>
+                <a:spcPts val="600"/>
+              </a:spcAft>
+            </a:pPr>
+            <a:endParaRPr lang="es-ES_tradnl" sz="1500" noProof="0" dirty="0"/>
+          </a:p>
+          <a:p>
+            <a:pPr defTabSz="914400">
+              <a:lnSpc>
+                <a:spcPct val="90000"/>
+              </a:lnSpc>
+              <a:spcAft>
+                <a:spcPts val="600"/>
+              </a:spcAft>
+            </a:pPr>
+            <a:r>
+              <a:rPr lang="es-ES_tradnl" sz="1500" noProof="0" dirty="0"/>
+              <a:t>2. ¿A quién ofrecer Producto 1 vs. Producto 2?</a:t>
+            </a:r>
+          </a:p>
+          <a:p>
+            <a:pPr defTabSz="914400">
+              <a:lnSpc>
+                <a:spcPct val="90000"/>
+              </a:lnSpc>
+              <a:spcAft>
+                <a:spcPts val="600"/>
+              </a:spcAft>
+            </a:pPr>
+            <a:r>
+              <a:rPr lang="es-ES_tradnl" sz="1500" noProof="0" dirty="0"/>
+              <a:t>   - Segmentación por propensión  </a:t>
+            </a:r>
+          </a:p>
+          <a:p>
+            <a:pPr defTabSz="914400">
+              <a:lnSpc>
+                <a:spcPct val="90000"/>
+              </a:lnSpc>
+              <a:spcAft>
+                <a:spcPts val="600"/>
+              </a:spcAft>
+            </a:pPr>
+            <a:r>
+              <a:rPr lang="es-ES_tradnl" sz="1500" noProof="0" dirty="0"/>
+              <a:t>   - Definición de bandas (alta/media/baja) y análisis de coste–beneficio</a:t>
+            </a:r>
+          </a:p>
+          <a:p>
+            <a:pPr defTabSz="914400">
+              <a:lnSpc>
+                <a:spcPct val="90000"/>
+              </a:lnSpc>
+              <a:spcAft>
+                <a:spcPts val="600"/>
+              </a:spcAft>
+            </a:pPr>
+            <a:endParaRPr lang="es-ES_tradnl" sz="1500" noProof="0" dirty="0"/>
+          </a:p>
+          <a:p>
+            <a:pPr defTabSz="914400">
+              <a:lnSpc>
+                <a:spcPct val="90000"/>
+              </a:lnSpc>
+              <a:spcAft>
+                <a:spcPts val="600"/>
+              </a:spcAft>
+            </a:pPr>
+            <a:r>
+              <a:rPr lang="es-ES_tradnl" sz="1500" noProof="0" dirty="0"/>
+              <a:t>3. ¿Nuestras decisiones son equitativas? (género, edad, educación…)  </a:t>
+            </a:r>
+          </a:p>
+          <a:p>
+            <a:pPr defTabSz="914400">
+              <a:lnSpc>
+                <a:spcPct val="90000"/>
+              </a:lnSpc>
+              <a:spcAft>
+                <a:spcPts val="600"/>
+              </a:spcAft>
+            </a:pPr>
+            <a:r>
+              <a:rPr lang="es-ES_tradnl" sz="1500" noProof="0" dirty="0"/>
+              <a:t>4. ¿Cómo manejamos cambios en factores económicos? </a:t>
+            </a:r>
+          </a:p>
+          <a:p>
+            <a:pPr defTabSz="914400">
+              <a:lnSpc>
+                <a:spcPct val="90000"/>
+              </a:lnSpc>
+              <a:spcAft>
+                <a:spcPts val="600"/>
+              </a:spcAft>
             </a:pPr>
             <a:endParaRPr lang="es-ES_tradnl" sz="1500" noProof="0" dirty="0"/>
           </a:p>

</xml_diff>